<commit_message>
Made Changes in code, Deleted Report and PPT Change
</commit_message>
<xml_diff>
--- a/BTP Presentation.pptx
+++ b/BTP Presentation.pptx
@@ -217,7 +217,7 @@
           <a:p>
             <a:fld id="{7487ADD9-2083-264C-A652-8D52D02F7E72}" type="datetimeFigureOut">
               <a:rPr lang="en-US" smtClean="0"/>
-              <a:t>11/19/2023</a:t>
+              <a:t>1/13/2024</a:t>
             </a:fld>
             <a:endParaRPr lang="en-US" dirty="0"/>
           </a:p>
@@ -1602,7 +1602,7 @@
           <a:p>
             <a:fld id="{AE46C21D-EBB5-4F3D-B06D-166777189317}" type="datetime1">
               <a:rPr lang="en-US" smtClean="0"/>
-              <a:t>11/19/2023</a:t>
+              <a:t>1/13/2024</a:t>
             </a:fld>
             <a:endParaRPr lang="en-US" dirty="0"/>
           </a:p>
@@ -2486,7 +2486,7 @@
           <a:p>
             <a:fld id="{1DFFEA26-EB1D-498C-95CD-1ECE586790AA}" type="datetime1">
               <a:rPr lang="en-US" smtClean="0"/>
-              <a:t>11/19/2023</a:t>
+              <a:t>1/13/2024</a:t>
             </a:fld>
             <a:endParaRPr lang="en-US" dirty="0"/>
           </a:p>
@@ -3662,7 +3662,7 @@
           <a:p>
             <a:fld id="{539842EE-D56F-4F18-94E7-094CEF23F906}" type="datetime1">
               <a:rPr lang="en-US" smtClean="0"/>
-              <a:t>11/19/2023</a:t>
+              <a:t>1/13/2024</a:t>
             </a:fld>
             <a:endParaRPr lang="en-US" dirty="0"/>
           </a:p>
@@ -5741,7 +5741,7 @@
           <a:p>
             <a:fld id="{45B08281-154C-4FEF-A6DF-18BA3AC0F374}" type="datetime1">
               <a:rPr lang="en-US" smtClean="0"/>
-              <a:t>11/19/2023</a:t>
+              <a:t>1/13/2024</a:t>
             </a:fld>
             <a:endParaRPr lang="en-US" dirty="0"/>
           </a:p>
@@ -6458,7 +6458,7 @@
           <a:p>
             <a:fld id="{04D857D4-BD7E-4A06-844B-AAD504F1114F}" type="datetime1">
               <a:rPr lang="en-US" smtClean="0"/>
-              <a:t>11/19/2023</a:t>
+              <a:t>1/13/2024</a:t>
             </a:fld>
             <a:endParaRPr lang="en-US" dirty="0"/>
           </a:p>
@@ -7685,7 +7685,7 @@
           <a:p>
             <a:fld id="{916AFA50-87A4-4E99-B112-8C6B1DFB84B2}" type="datetime1">
               <a:rPr lang="en-US" smtClean="0"/>
-              <a:t>11/19/2023</a:t>
+              <a:t>1/13/2024</a:t>
             </a:fld>
             <a:endParaRPr lang="en-US" dirty="0"/>
           </a:p>
@@ -8276,7 +8276,7 @@
           <a:p>
             <a:fld id="{6B3905CA-BF0F-4A1B-AA0D-85E42F5D5A85}" type="datetime1">
               <a:rPr lang="en-US" smtClean="0"/>
-              <a:t>11/19/2023</a:t>
+              <a:t>1/13/2024</a:t>
             </a:fld>
             <a:endParaRPr lang="en-US" dirty="0"/>
           </a:p>
@@ -8748,7 +8748,7 @@
           <a:p>
             <a:fld id="{D3DA9A77-60C0-4BB8-898D-2828EE4073AD}" type="datetime1">
               <a:rPr lang="en-US" smtClean="0"/>
-              <a:t>11/19/2023</a:t>
+              <a:t>1/13/2024</a:t>
             </a:fld>
             <a:endParaRPr lang="en-US" dirty="0"/>
           </a:p>
@@ -9597,7 +9597,7 @@
           <a:p>
             <a:fld id="{C1F30CD5-42B1-4614-9F46-5D29928CC2DB}" type="datetime1">
               <a:rPr lang="en-US" smtClean="0"/>
-              <a:t>11/19/2023</a:t>
+              <a:t>1/13/2024</a:t>
             </a:fld>
             <a:endParaRPr lang="en-US" dirty="0"/>
           </a:p>
@@ -11821,7 +11821,7 @@
           <a:p>
             <a:fld id="{EE6020E3-D95B-4E55-964F-4B1A98BDAA6F}" type="datetime1">
               <a:rPr lang="en-US" smtClean="0"/>
-              <a:t>11/19/2023</a:t>
+              <a:t>1/13/2024</a:t>
             </a:fld>
             <a:endParaRPr lang="en-US" dirty="0"/>
           </a:p>
@@ -12089,7 +12089,7 @@
           <a:p>
             <a:fld id="{FC9A72C8-1C87-42EF-8A11-BF6DFA19ED8B}" type="datetime1">
               <a:rPr lang="en-US" smtClean="0"/>
-              <a:t>11/19/2023</a:t>
+              <a:t>1/13/2024</a:t>
             </a:fld>
             <a:endParaRPr lang="en-US" dirty="0"/>
           </a:p>
@@ -16635,12 +16635,60 @@
           </a:p>
         </p:txBody>
       </p:sp>
+      <p:sp>
+        <p:nvSpPr>
+          <p:cNvPr id="15" name="Rectangle 14">
+            <a:extLst>
+              <a:ext uri="{FF2B5EF4-FFF2-40B4-BE49-F238E27FC236}">
+                <a16:creationId xmlns:a16="http://schemas.microsoft.com/office/drawing/2014/main" id="{5A0CB0DF-A412-B998-B95B-CF0C094A455E}"/>
+              </a:ext>
+            </a:extLst>
+          </p:cNvPr>
+          <p:cNvSpPr/>
+          <p:nvPr/>
+        </p:nvSpPr>
+        <p:spPr>
+          <a:xfrm>
+            <a:off x="4189901" y="4920340"/>
+            <a:ext cx="1906099" cy="461665"/>
+          </a:xfrm>
+          <a:prstGeom prst="rect">
+            <a:avLst/>
+          </a:prstGeom>
+          <a:noFill/>
+        </p:spPr>
+        <p:txBody>
+          <a:bodyPr wrap="none" lIns="91440" tIns="45720" rIns="91440" bIns="45720">
+            <a:spAutoFit/>
+          </a:bodyPr>
+          <a:lstStyle/>
+          <a:p>
+            <a:pPr algn="ctr"/>
+            <a:r>
+              <a:rPr lang="en-US" sz="2400" b="1" cap="none" spc="0" dirty="0">
+                <a:ln w="0"/>
+                <a:solidFill>
+                  <a:schemeClr val="tx1"/>
+                </a:solidFill>
+                <a:effectLst>
+                  <a:outerShdw blurRad="38100" dist="19050" dir="2700000" algn="tl" rotWithShape="0">
+                    <a:schemeClr val="dk1">
+                      <a:alpha val="40000"/>
+                    </a:schemeClr>
+                  </a:outerShdw>
+                </a:effectLst>
+              </a:rPr>
+              <a:t>Robot Model</a:t>
+            </a:r>
+          </a:p>
+        </p:txBody>
+      </p:sp>
       <p:pic>
         <p:nvPicPr>
-          <p:cNvPr id="4" name="Picture 3" descr="A small robot with wheels and wires&#10;&#10;Description automatically generated">
-            <a:extLst>
-              <a:ext uri="{FF2B5EF4-FFF2-40B4-BE49-F238E27FC236}">
-                <a16:creationId xmlns:a16="http://schemas.microsoft.com/office/drawing/2014/main" id="{97D6C3CB-024E-A1C2-4598-71C0066433FB}"/>
+          <p:cNvPr id="8" name="Picture 7" descr="A car with wheels and wires&#10;&#10;Description automatically generated">
+            <a:extLst>
+              <a:ext uri="{FF2B5EF4-FFF2-40B4-BE49-F238E27FC236}">
+                <a16:creationId xmlns:a16="http://schemas.microsoft.com/office/drawing/2014/main" id="{9C08E50C-19C3-C867-5DAA-51BFD1A7FC74}"/>
               </a:ext>
             </a:extLst>
           </p:cNvPr>
@@ -16657,62 +16705,14 @@
         </p:blipFill>
         <p:spPr>
           <a:xfrm>
-            <a:off x="3248250" y="4589784"/>
-            <a:ext cx="4121909" cy="2000337"/>
+            <a:off x="6699147" y="4086605"/>
+            <a:ext cx="3234612" cy="2590800"/>
           </a:xfrm>
           <a:prstGeom prst="rect">
             <a:avLst/>
           </a:prstGeom>
         </p:spPr>
       </p:pic>
-      <p:sp>
-        <p:nvSpPr>
-          <p:cNvPr id="15" name="Rectangle 14">
-            <a:extLst>
-              <a:ext uri="{FF2B5EF4-FFF2-40B4-BE49-F238E27FC236}">
-                <a16:creationId xmlns:a16="http://schemas.microsoft.com/office/drawing/2014/main" id="{5A0CB0DF-A412-B998-B95B-CF0C094A455E}"/>
-              </a:ext>
-            </a:extLst>
-          </p:cNvPr>
-          <p:cNvSpPr/>
-          <p:nvPr/>
-        </p:nvSpPr>
-        <p:spPr>
-          <a:xfrm>
-            <a:off x="4150983" y="4086605"/>
-            <a:ext cx="1906099" cy="461665"/>
-          </a:xfrm>
-          <a:prstGeom prst="rect">
-            <a:avLst/>
-          </a:prstGeom>
-          <a:noFill/>
-        </p:spPr>
-        <p:txBody>
-          <a:bodyPr wrap="none" lIns="91440" tIns="45720" rIns="91440" bIns="45720">
-            <a:spAutoFit/>
-          </a:bodyPr>
-          <a:lstStyle/>
-          <a:p>
-            <a:pPr algn="ctr"/>
-            <a:r>
-              <a:rPr lang="en-US" sz="2400" b="1" cap="none" spc="0" dirty="0">
-                <a:ln w="0"/>
-                <a:solidFill>
-                  <a:schemeClr val="tx1"/>
-                </a:solidFill>
-                <a:effectLst>
-                  <a:outerShdw blurRad="38100" dist="19050" dir="2700000" algn="tl" rotWithShape="0">
-                    <a:schemeClr val="dk1">
-                      <a:alpha val="40000"/>
-                    </a:schemeClr>
-                  </a:outerShdw>
-                </a:effectLst>
-              </a:rPr>
-              <a:t>Robot Model</a:t>
-            </a:r>
-          </a:p>
-        </p:txBody>
-      </p:sp>
     </p:spTree>
     <p:extLst>
       <p:ext uri="{BB962C8B-B14F-4D97-AF65-F5344CB8AC3E}">
@@ -17296,66 +17296,6 @@
           </a:p>
         </p:txBody>
       </p:sp>
-      <p:pic>
-        <p:nvPicPr>
-          <p:cNvPr id="7" name="Picture 6">
-            <a:extLst>
-              <a:ext uri="{FF2B5EF4-FFF2-40B4-BE49-F238E27FC236}">
-                <a16:creationId xmlns:a16="http://schemas.microsoft.com/office/drawing/2014/main" id="{B3029066-B16C-23C3-67F1-EB1A52752705}"/>
-              </a:ext>
-            </a:extLst>
-          </p:cNvPr>
-          <p:cNvPicPr>
-            <a:picLocks noChangeAspect="1"/>
-          </p:cNvPicPr>
-          <p:nvPr/>
-        </p:nvPicPr>
-        <p:blipFill>
-          <a:blip r:embed="rId2"/>
-          <a:stretch>
-            <a:fillRect/>
-          </a:stretch>
-        </p:blipFill>
-        <p:spPr>
-          <a:xfrm>
-            <a:off x="381000" y="4891983"/>
-            <a:ext cx="2669017" cy="1464367"/>
-          </a:xfrm>
-          <a:prstGeom prst="rect">
-            <a:avLst/>
-          </a:prstGeom>
-        </p:spPr>
-      </p:pic>
-      <p:pic>
-        <p:nvPicPr>
-          <p:cNvPr id="9" name="Picture 8">
-            <a:extLst>
-              <a:ext uri="{FF2B5EF4-FFF2-40B4-BE49-F238E27FC236}">
-                <a16:creationId xmlns:a16="http://schemas.microsoft.com/office/drawing/2014/main" id="{4D53DDF8-5526-5FEE-5D27-2BBE267CE752}"/>
-              </a:ext>
-            </a:extLst>
-          </p:cNvPr>
-          <p:cNvPicPr>
-            <a:picLocks noChangeAspect="1"/>
-          </p:cNvPicPr>
-          <p:nvPr/>
-        </p:nvPicPr>
-        <p:blipFill>
-          <a:blip r:embed="rId3"/>
-          <a:stretch>
-            <a:fillRect/>
-          </a:stretch>
-        </p:blipFill>
-        <p:spPr>
-          <a:xfrm>
-            <a:off x="8626184" y="4891983"/>
-            <a:ext cx="3184816" cy="1464367"/>
-          </a:xfrm>
-          <a:prstGeom prst="rect">
-            <a:avLst/>
-          </a:prstGeom>
-        </p:spPr>
-      </p:pic>
     </p:spTree>
     <p:extLst>
       <p:ext uri="{BB962C8B-B14F-4D97-AF65-F5344CB8AC3E}">
@@ -18888,12 +18828,23 @@
 </file>
 
 <file path=customXml/item1.xml><?xml version="1.0" encoding="utf-8"?>
-<?mso-contentType ?>
-<FormTemplates xmlns="http://schemas.microsoft.com/sharepoint/v3/contenttype/forms">
-  <Display>DocumentLibraryForm</Display>
-  <Edit>DocumentLibraryForm</Edit>
-  <New>DocumentLibraryForm</New>
-</FormTemplates>
+<p:properties xmlns:p="http://schemas.microsoft.com/office/2006/metadata/properties" xmlns:xsi="http://www.w3.org/2001/XMLSchema-instance" xmlns:pc="http://schemas.microsoft.com/office/infopath/2007/PartnerControls">
+  <documentManagement>
+    <_ip_UnifiedCompliancePolicyUIAction xmlns="http://schemas.microsoft.com/sharepoint/v3" xsi:nil="true"/>
+    <Image xmlns="71af3243-3dd4-4a8d-8c0d-dd76da1f02a5">
+      <Url xsi:nil="true"/>
+      <Description xsi:nil="true"/>
+    </Image>
+    <Status xmlns="71af3243-3dd4-4a8d-8c0d-dd76da1f02a5">Not started</Status>
+    <_ip_UnifiedCompliancePolicyProperties xmlns="http://schemas.microsoft.com/sharepoint/v3" xsi:nil="true"/>
+    <ImageTagsTaxHTField xmlns="71af3243-3dd4-4a8d-8c0d-dd76da1f02a5">
+      <Terms xmlns="http://schemas.microsoft.com/office/infopath/2007/PartnerControls"/>
+    </ImageTagsTaxHTField>
+    <TaxCatchAll xmlns="230e9df3-be65-4c73-a93b-d1236ebd677e" xsi:nil="true"/>
+    <MediaServiceKeyPoints xmlns="71af3243-3dd4-4a8d-8c0d-dd76da1f02a5" xsi:nil="true"/>
+    <Background xmlns="71af3243-3dd4-4a8d-8c0d-dd76da1f02a5">false</Background>
+  </documentManagement>
+</p:properties>
 </file>
 
 <file path=customXml/item2.xml><?xml version="1.0" encoding="utf-8"?>
@@ -19209,29 +19160,29 @@
 </file>
 
 <file path=customXml/item3.xml><?xml version="1.0" encoding="utf-8"?>
-<p:properties xmlns:p="http://schemas.microsoft.com/office/2006/metadata/properties" xmlns:xsi="http://www.w3.org/2001/XMLSchema-instance" xmlns:pc="http://schemas.microsoft.com/office/infopath/2007/PartnerControls">
-  <documentManagement>
-    <_ip_UnifiedCompliancePolicyUIAction xmlns="http://schemas.microsoft.com/sharepoint/v3" xsi:nil="true"/>
-    <Image xmlns="71af3243-3dd4-4a8d-8c0d-dd76da1f02a5">
-      <Url xsi:nil="true"/>
-      <Description xsi:nil="true"/>
-    </Image>
-    <Status xmlns="71af3243-3dd4-4a8d-8c0d-dd76da1f02a5">Not started</Status>
-    <_ip_UnifiedCompliancePolicyProperties xmlns="http://schemas.microsoft.com/sharepoint/v3" xsi:nil="true"/>
-    <ImageTagsTaxHTField xmlns="71af3243-3dd4-4a8d-8c0d-dd76da1f02a5">
-      <Terms xmlns="http://schemas.microsoft.com/office/infopath/2007/PartnerControls"/>
-    </ImageTagsTaxHTField>
-    <TaxCatchAll xmlns="230e9df3-be65-4c73-a93b-d1236ebd677e" xsi:nil="true"/>
-    <MediaServiceKeyPoints xmlns="71af3243-3dd4-4a8d-8c0d-dd76da1f02a5" xsi:nil="true"/>
-    <Background xmlns="71af3243-3dd4-4a8d-8c0d-dd76da1f02a5">false</Background>
-  </documentManagement>
-</p:properties>
+<?mso-contentType ?>
+<FormTemplates xmlns="http://schemas.microsoft.com/sharepoint/v3/contenttype/forms">
+  <Display>DocumentLibraryForm</Display>
+  <Edit>DocumentLibraryForm</Edit>
+  <New>DocumentLibraryForm</New>
+</FormTemplates>
 </file>
 
 <file path=customXml/itemProps1.xml><?xml version="1.0" encoding="utf-8"?>
-<ds:datastoreItem xmlns:ds="http://schemas.openxmlformats.org/officeDocument/2006/customXml" ds:itemID="{42076B5C-85B0-4D30-852D-5E5312EEA93B}">
+<ds:datastoreItem xmlns:ds="http://schemas.openxmlformats.org/officeDocument/2006/customXml" ds:itemID="{1342FAFE-88B4-49B4-9588-86CB0E564E50}">
   <ds:schemaRefs>
-    <ds:schemaRef ds:uri="http://schemas.microsoft.com/sharepoint/v3/contenttype/forms"/>
+    <ds:schemaRef ds:uri="http://schemas.microsoft.com/office/2006/metadata/properties"/>
+    <ds:schemaRef ds:uri="http://schemas.microsoft.com/office/2006/documentManagement/types"/>
+    <ds:schemaRef ds:uri="http://www.w3.org/XML/1998/namespace"/>
+    <ds:schemaRef ds:uri="http://schemas.microsoft.com/office/infopath/2007/PartnerControls"/>
+    <ds:schemaRef ds:uri="http://schemas.openxmlformats.org/package/2006/metadata/core-properties"/>
+    <ds:schemaRef ds:uri="http://purl.org/dc/dcmitype/"/>
+    <ds:schemaRef ds:uri="http://schemas.microsoft.com/sharepoint/v3"/>
+    <ds:schemaRef ds:uri="http://purl.org/dc/terms/"/>
+    <ds:schemaRef ds:uri="http://purl.org/dc/elements/1.1/"/>
+    <ds:schemaRef ds:uri="230e9df3-be65-4c73-a93b-d1236ebd677e"/>
+    <ds:schemaRef ds:uri="16c05727-aa75-4e4a-9b5f-8a80a1165891"/>
+    <ds:schemaRef ds:uri="71af3243-3dd4-4a8d-8c0d-dd76da1f02a5"/>
   </ds:schemaRefs>
 </ds:datastoreItem>
 </file>
@@ -19258,20 +19209,9 @@
 </file>
 
 <file path=customXml/itemProps3.xml><?xml version="1.0" encoding="utf-8"?>
-<ds:datastoreItem xmlns:ds="http://schemas.openxmlformats.org/officeDocument/2006/customXml" ds:itemID="{1342FAFE-88B4-49B4-9588-86CB0E564E50}">
+<ds:datastoreItem xmlns:ds="http://schemas.openxmlformats.org/officeDocument/2006/customXml" ds:itemID="{42076B5C-85B0-4D30-852D-5E5312EEA93B}">
   <ds:schemaRefs>
-    <ds:schemaRef ds:uri="http://schemas.microsoft.com/office/2006/metadata/properties"/>
-    <ds:schemaRef ds:uri="http://schemas.microsoft.com/office/2006/documentManagement/types"/>
-    <ds:schemaRef ds:uri="http://www.w3.org/XML/1998/namespace"/>
-    <ds:schemaRef ds:uri="http://schemas.microsoft.com/office/infopath/2007/PartnerControls"/>
-    <ds:schemaRef ds:uri="http://schemas.openxmlformats.org/package/2006/metadata/core-properties"/>
-    <ds:schemaRef ds:uri="http://purl.org/dc/dcmitype/"/>
-    <ds:schemaRef ds:uri="http://schemas.microsoft.com/sharepoint/v3"/>
-    <ds:schemaRef ds:uri="http://purl.org/dc/terms/"/>
-    <ds:schemaRef ds:uri="http://purl.org/dc/elements/1.1/"/>
-    <ds:schemaRef ds:uri="230e9df3-be65-4c73-a93b-d1236ebd677e"/>
-    <ds:schemaRef ds:uri="16c05727-aa75-4e4a-9b5f-8a80a1165891"/>
-    <ds:schemaRef ds:uri="71af3243-3dd4-4a8d-8c0d-dd76da1f02a5"/>
+    <ds:schemaRef ds:uri="http://schemas.microsoft.com/sharepoint/v3/contenttype/forms"/>
   </ds:schemaRefs>
 </ds:datastoreItem>
 </file>

</xml_diff>